<commit_message>
Add a command helper and update the powerpoint with an additional QR code in the end
</commit_message>
<xml_diff>
--- a/Tighten your Nuget packages.pptx
+++ b/Tighten your Nuget packages.pptx
@@ -269,7 +269,7 @@
           <a:p>
             <a:fld id="{37581487-DED7-4908-9A01-0A45EDCB1D6C}" type="datetimeFigureOut">
               <a:rPr lang="de-DE" sz="1000" smtClean="0"/>
-              <a:t>16.11.2023</a:t>
+              <a:t>29.11.2023</a:t>
             </a:fld>
             <a:endParaRPr lang="de-DE" sz="1000"/>
           </a:p>
@@ -701,13 +701,8 @@
           <a:p>
             <a:r>
               <a:rPr lang="de-DE" dirty="0"/>
-              <a:t>Before Demo starts make sure you‘ve logged in to NuGet</a:t>
-            </a:r>
-            <a:r>
-              <a:rPr lang="de-DE"/>
-              <a:t>.org and have the main.yml open on Github.org for showing the pipeline.</a:t>
-            </a:r>
-            <a:endParaRPr lang="de-DE" dirty="0"/>
+              <a:t>Before Demo starts make sure you‘ve logged in to NuGet.org and have the main.yml open on Github.org for showing the pipeline.</a:t>
+            </a:r>
           </a:p>
           <a:p>
             <a:r>
@@ -722,36 +717,21 @@
             </a:r>
           </a:p>
           <a:p>
-            <a:endParaRPr lang="de-DE" dirty="0"/>
-          </a:p>
-          <a:p>
             <a:r>
               <a:rPr lang="de-DE" dirty="0"/>
-              <a:t>******************************************</a:t>
-            </a:r>
-          </a:p>
-          <a:p>
-            <a:endParaRPr lang="de-DE" dirty="0"/>
+              <a:t>Open explorer to C:\VisugXL\TightenYourNugetPackages.Client</a:t>
+            </a:r>
           </a:p>
           <a:p>
             <a:r>
               <a:rPr lang="de-DE" dirty="0"/>
-              <a:t>Hi, thank you for joining this session about Tighten your NuGet packages.</a:t>
+              <a:t>And a powershell to C:\VisugXL\TightenYourNugetPackages.Client</a:t>
             </a:r>
           </a:p>
           <a:p>
             <a:r>
               <a:rPr lang="de-DE" dirty="0"/>
-              <a:t>This is my first session ever, never done a public speaking thing. But it‘s the first time that I also have something worth sharing with other people as well.</a:t>
-            </a:r>
-          </a:p>
-          <a:p>
-            <a:endParaRPr lang="de-DE" dirty="0"/>
-          </a:p>
-          <a:p>
-            <a:r>
-              <a:rPr lang="de-DE" dirty="0"/>
-              <a:t>The session is focussing on the naive approach of a lot of developers who then unwillingly get into unexpected situations without even knowing it. I started this research after Techorama 2022 where I attended a sesion about NuGet packages and where I was made aware of possible issues. But without any solutions or examples on how to tackle it and especially why should I care about it.</a:t>
+              <a:t>Start C:\Tools\SnapTimer</a:t>
             </a:r>
           </a:p>
         </p:txBody>
@@ -2123,16 +2103,6 @@
           <a:bodyPr/>
           <a:lstStyle/>
           <a:p>
-            <a:r>
-              <a:rPr lang="nl-BE" dirty="0"/>
-              <a:t>About me, I’m Pieter Samyn a Technology lead in ZF transics. I still feel like a backend developer but I also like to share my knowledge with my team and research new things that come up. I do have to admit my scrum master is most likely not that fond of me when I pick up a story as it is subordinate to my team problems.</a:t>
-            </a:r>
-          </a:p>
-          <a:p>
-            <a:r>
-              <a:rPr lang="nl-BE" dirty="0"/>
-              <a:t>Currently I’m working with my Team on transforming an existing solution to a cloud native solution on the AWS stack.</a:t>
-            </a:r>
             <a:endParaRPr lang="en-US" dirty="0"/>
           </a:p>
         </p:txBody>
@@ -19582,6 +19552,42 @@
           </a:p>
         </p:txBody>
       </p:sp>
+      <p:pic>
+        <p:nvPicPr>
+          <p:cNvPr id="7" name="Picture 6" descr="A qr code with black dots&#10;&#10;Description automatically generated">
+            <a:extLst>
+              <a:ext uri="{FF2B5EF4-FFF2-40B4-BE49-F238E27FC236}">
+                <a16:creationId xmlns:a16="http://schemas.microsoft.com/office/drawing/2014/main" id="{7534489A-3FB9-C5FE-605D-6A0C137FC614}"/>
+              </a:ext>
+            </a:extLst>
+          </p:cNvPr>
+          <p:cNvPicPr>
+            <a:picLocks noChangeAspect="1"/>
+          </p:cNvPicPr>
+          <p:nvPr/>
+        </p:nvPicPr>
+        <p:blipFill>
+          <a:blip r:embed="rId12">
+            <a:extLst>
+              <a:ext uri="{28A0092B-C50C-407E-A947-70E740481C1C}">
+                <a14:useLocalDpi xmlns:a14="http://schemas.microsoft.com/office/drawing/2010/main" val="0"/>
+              </a:ext>
+            </a:extLst>
+          </a:blip>
+          <a:stretch>
+            <a:fillRect/>
+          </a:stretch>
+        </p:blipFill>
+        <p:spPr>
+          <a:xfrm>
+            <a:off x="6823541" y="793545"/>
+            <a:ext cx="1960457" cy="1960457"/>
+          </a:xfrm>
+          <a:prstGeom prst="rect">
+            <a:avLst/>
+          </a:prstGeom>
+        </p:spPr>
+      </p:pic>
     </p:spTree>
     <p:extLst>
       <p:ext uri="{BB962C8B-B14F-4D97-AF65-F5344CB8AC3E}">

</xml_diff>